<commit_message>
presentation, including fancy graphics
</commit_message>
<xml_diff>
--- a/presentation/Pr�sentation.pptx
+++ b/presentation/Pr�sentation.pptx
@@ -6,12 +6,19 @@
   </p:sldMasterIdLst>
   <p:sldIdLst>
     <p:sldId id="256" r:id="rId2"/>
-    <p:sldId id="257" r:id="rId3"/>
+    <p:sldId id="258" r:id="rId3"/>
+    <p:sldId id="259" r:id="rId4"/>
+    <p:sldId id="260" r:id="rId5"/>
+    <p:sldId id="261" r:id="rId6"/>
+    <p:sldId id="262" r:id="rId7"/>
+    <p:sldId id="263" r:id="rId8"/>
+    <p:sldId id="264" r:id="rId9"/>
+    <p:sldId id="265" r:id="rId10"/>
   </p:sldIdLst>
   <p:sldSz cx="9144000" cy="6858000" type="screen4x3"/>
   <p:notesSz cx="6858000" cy="9144000"/>
   <p:custDataLst>
-    <p:tags r:id="rId4"/>
+    <p:tags r:id="rId11"/>
   </p:custDataLst>
   <p:defaultTextStyle>
     <a:defPPr>
@@ -726,15 +733,40 @@
                 <a:solidFill>
                   <a:schemeClr val="bg1"/>
                 </a:solidFill>
+                <a:latin typeface="Segoe Marker" pitchFamily="66" charset="0"/>
               </a:defRPr>
             </a:lvl1pPr>
           </a:lstStyle>
           <a:p>
             <a:r>
-              <a:rPr lang="de-DE" dirty="0" smtClean="0"/>
-              <a:t>Titelmasterformat durch Klicken bearbeiten</a:t>
-            </a:r>
-            <a:endParaRPr lang="de-CH" dirty="0"/>
+              <a:rPr lang="en-US" noProof="0" dirty="0" err="1" smtClean="0"/>
+              <a:t>Titelmasterformat</a:t>
+            </a:r>
+            <a:r>
+              <a:rPr lang="en-US" noProof="0" dirty="0" smtClean="0"/>
+              <a:t> </a:t>
+            </a:r>
+            <a:r>
+              <a:rPr lang="en-US" noProof="0" dirty="0" err="1" smtClean="0"/>
+              <a:t>durch</a:t>
+            </a:r>
+            <a:r>
+              <a:rPr lang="en-US" noProof="0" dirty="0" smtClean="0"/>
+              <a:t> </a:t>
+            </a:r>
+            <a:r>
+              <a:rPr lang="en-US" noProof="0" dirty="0" err="1" smtClean="0"/>
+              <a:t>Klicken</a:t>
+            </a:r>
+            <a:r>
+              <a:rPr lang="en-US" noProof="0" dirty="0" smtClean="0"/>
+              <a:t> </a:t>
+            </a:r>
+            <a:r>
+              <a:rPr lang="en-US" noProof="0" dirty="0" err="1" smtClean="0"/>
+              <a:t>bearbeiten</a:t>
+            </a:r>
+            <a:endParaRPr lang="en-US" noProof="0" dirty="0"/>
           </a:p>
         </p:txBody>
       </p:sp>
@@ -766,6 +798,7 @@
                     <a:lumOff val="15000"/>
                   </a:schemeClr>
                 </a:solidFill>
+                <a:latin typeface="Wasco Sans" pitchFamily="34" charset="0"/>
               </a:defRPr>
             </a:lvl1pPr>
             <a:lvl2pPr marL="457200" indent="0" algn="ctr">
@@ -851,10 +884,10 @@
           </a:lstStyle>
           <a:p>
             <a:r>
-              <a:rPr lang="de-DE" dirty="0" smtClean="0"/>
+              <a:rPr lang="en-US" noProof="0" smtClean="0"/>
               <a:t>Formatvorlage des Untertitelmasters durch Klicken bearbeiten</a:t>
             </a:r>
-            <a:endParaRPr lang="de-CH" dirty="0"/>
+            <a:endParaRPr lang="en-US" noProof="0"/>
           </a:p>
         </p:txBody>
       </p:sp>
@@ -3415,41 +3448,1131 @@
             <a:spLocks noGrp="1"/>
           </p:cNvSpPr>
           <p:nvPr>
-            <p:ph type="title"/>
-          </p:nvPr>
-        </p:nvSpPr>
-        <p:spPr/>
-        <p:txBody>
-          <a:bodyPr/>
-          <a:lstStyle/>
-          <a:p>
+            <p:ph type="ctrTitle"/>
+          </p:nvPr>
+        </p:nvSpPr>
+        <p:spPr/>
+        <p:txBody>
+          <a:bodyPr>
+            <a:normAutofit/>
+          </a:bodyPr>
+          <a:lstStyle/>
+          <a:p>
+            <a:r>
+              <a:rPr lang="de-CH" dirty="0" err="1" smtClean="0"/>
+              <a:t>Cloud</a:t>
+            </a:r>
+            <a:r>
+              <a:rPr lang="de-CH" dirty="0" smtClean="0"/>
+              <a:t> Rendering</a:t>
+            </a:r>
             <a:endParaRPr lang="de-CH" dirty="0"/>
           </a:p>
         </p:txBody>
       </p:sp>
       <p:sp>
         <p:nvSpPr>
-          <p:cNvPr id="3" name="Inhaltsplatzhalter 2"/>
-          <p:cNvSpPr>
-            <a:spLocks noGrp="1"/>
-          </p:cNvSpPr>
-          <p:nvPr>
-            <p:ph idx="1"/>
-          </p:nvPr>
-        </p:nvSpPr>
-        <p:spPr/>
-        <p:txBody>
-          <a:bodyPr/>
-          <a:lstStyle/>
-          <a:p>
-            <a:endParaRPr lang="de-CH"/>
-          </a:p>
-        </p:txBody>
-      </p:sp>
+          <p:cNvPr id="3" name="Untertitel 2"/>
+          <p:cNvSpPr>
+            <a:spLocks noGrp="1"/>
+          </p:cNvSpPr>
+          <p:nvPr>
+            <p:ph type="subTitle" idx="1"/>
+          </p:nvPr>
+        </p:nvSpPr>
+        <p:spPr>
+          <a:xfrm>
+            <a:off x="683568" y="1966392"/>
+            <a:ext cx="7776864" cy="4486944"/>
+          </a:xfrm>
+        </p:spPr>
+        <p:txBody>
+          <a:bodyPr>
+            <a:normAutofit lnSpcReduction="10000"/>
+          </a:bodyPr>
+          <a:lstStyle/>
+          <a:p>
+            <a:pPr marL="514350" indent="-514350">
+              <a:buFont typeface="+mj-lt"/>
+              <a:buAutoNum type="arabicPeriod"/>
+            </a:pPr>
+            <a:r>
+              <a:rPr lang="en-US" dirty="0" smtClean="0"/>
+              <a:t>Rasterize visible area into fields</a:t>
+            </a:r>
+          </a:p>
+          <a:p>
+            <a:pPr marL="514350" indent="-514350">
+              <a:buFont typeface="+mj-lt"/>
+              <a:buAutoNum type="arabicPeriod"/>
+            </a:pPr>
+            <a:r>
+              <a:rPr lang="en-US" dirty="0" smtClean="0"/>
+              <a:t>For each field</a:t>
+            </a:r>
+          </a:p>
+          <a:p>
+            <a:pPr marL="971550" lvl="1" indent="-514350" algn="l">
+              <a:buFont typeface="+mj-lt"/>
+              <a:buAutoNum type="alphaLcPeriod"/>
+            </a:pPr>
+            <a:r>
+              <a:rPr lang="en-US" dirty="0" smtClean="0">
+                <a:solidFill>
+                  <a:schemeClr val="tx1">
+                    <a:lumMod val="85000"/>
+                    <a:lumOff val="15000"/>
+                  </a:schemeClr>
+                </a:solidFill>
+                <a:latin typeface="Wasco Sans" pitchFamily="34" charset="0"/>
+              </a:rPr>
+              <a:t>Calculate the line between player and sample field</a:t>
+            </a:r>
+          </a:p>
+          <a:p>
+            <a:pPr marL="971550" lvl="1" indent="-514350" algn="l">
+              <a:buFont typeface="+mj-lt"/>
+              <a:buAutoNum type="alphaLcPeriod"/>
+            </a:pPr>
+            <a:r>
+              <a:rPr lang="en-US" dirty="0" smtClean="0">
+                <a:solidFill>
+                  <a:schemeClr val="tx1">
+                    <a:lumMod val="85000"/>
+                    <a:lumOff val="15000"/>
+                  </a:schemeClr>
+                </a:solidFill>
+                <a:latin typeface="Wasco Sans" pitchFamily="34" charset="0"/>
+              </a:rPr>
+              <a:t>Count the number of blocking-</a:t>
+            </a:r>
+            <a:r>
+              <a:rPr lang="en-US" dirty="0" err="1" smtClean="0">
+                <a:solidFill>
+                  <a:schemeClr val="tx1">
+                    <a:lumMod val="85000"/>
+                    <a:lumOff val="15000"/>
+                  </a:schemeClr>
+                </a:solidFill>
+                <a:latin typeface="Wasco Sans" pitchFamily="34" charset="0"/>
+              </a:rPr>
+              <a:t>nonblocking</a:t>
+            </a:r>
+            <a:r>
+              <a:rPr lang="en-US" dirty="0" smtClean="0">
+                <a:solidFill>
+                  <a:schemeClr val="tx1">
+                    <a:lumMod val="85000"/>
+                    <a:lumOff val="15000"/>
+                  </a:schemeClr>
+                </a:solidFill>
+                <a:latin typeface="Wasco Sans" pitchFamily="34" charset="0"/>
+              </a:rPr>
+              <a:t> transitions</a:t>
+            </a:r>
+          </a:p>
+          <a:p>
+            <a:pPr marL="971550" lvl="1" indent="-514350" algn="l">
+              <a:buFont typeface="+mj-lt"/>
+              <a:buAutoNum type="alphaLcPeriod"/>
+            </a:pPr>
+            <a:r>
+              <a:rPr lang="en-US" dirty="0" smtClean="0">
+                <a:solidFill>
+                  <a:schemeClr val="tx1">
+                    <a:lumMod val="85000"/>
+                    <a:lumOff val="15000"/>
+                  </a:schemeClr>
+                </a:solidFill>
+                <a:latin typeface="Wasco Sans" pitchFamily="34" charset="0"/>
+              </a:rPr>
+              <a:t>If the number is &gt;= 2, make it invisible</a:t>
+            </a:r>
+          </a:p>
+          <a:p>
+            <a:pPr marL="971550" lvl="1" indent="-514350" algn="l">
+              <a:buFont typeface="+mj-lt"/>
+              <a:buAutoNum type="alphaLcPeriod"/>
+            </a:pPr>
+            <a:r>
+              <a:rPr lang="en-US" dirty="0" smtClean="0">
+                <a:solidFill>
+                  <a:schemeClr val="tx1">
+                    <a:lumMod val="85000"/>
+                    <a:lumOff val="15000"/>
+                  </a:schemeClr>
+                </a:solidFill>
+                <a:latin typeface="Wasco Sans" pitchFamily="34" charset="0"/>
+              </a:rPr>
+              <a:t>If it’s &lt; 2, calculate its light falloff</a:t>
+            </a:r>
+            <a:endParaRPr lang="en-US" dirty="0">
+              <a:solidFill>
+                <a:schemeClr val="tx1">
+                  <a:lumMod val="85000"/>
+                  <a:lumOff val="15000"/>
+                </a:schemeClr>
+              </a:solidFill>
+              <a:latin typeface="Wasco Sans" pitchFamily="34" charset="0"/>
+            </a:endParaRPr>
+          </a:p>
+        </p:txBody>
+      </p:sp>
+      <p:pic>
+        <p:nvPicPr>
+          <p:cNvPr id="9218" name="Picture 2" descr="C:\Users\Cedric Reichenbach\Git\Uni\Ape_On_Tape\presentation\img\transition.png"/>
+          <p:cNvPicPr>
+            <a:picLocks noChangeAspect="1" noChangeArrowheads="1"/>
+          </p:cNvPicPr>
+          <p:nvPr/>
+        </p:nvPicPr>
+        <p:blipFill>
+          <a:blip r:embed="rId2">
+            <a:extLst>
+              <a:ext uri="{28A0092B-C50C-407E-A947-70E740481C1C}">
+                <a14:useLocalDpi xmlns:a14="http://schemas.microsoft.com/office/drawing/2010/main" val="0"/>
+              </a:ext>
+            </a:extLst>
+          </a:blip>
+          <a:srcRect/>
+          <a:stretch>
+            <a:fillRect/>
+          </a:stretch>
+        </p:blipFill>
+        <p:spPr bwMode="auto">
+          <a:xfrm>
+            <a:off x="7164288" y="3859579"/>
+            <a:ext cx="1656184" cy="844992"/>
+          </a:xfrm>
+          <a:prstGeom prst="rect">
+            <a:avLst/>
+          </a:prstGeom>
+          <a:ln>
+            <a:noFill/>
+          </a:ln>
+          <a:effectLst>
+            <a:softEdge rad="112500"/>
+          </a:effectLst>
+          <a:extLst>
+            <a:ext uri="{909E8E84-426E-40DD-AFC4-6F175D3DCCD1}">
+              <a14:hiddenFill xmlns:a14="http://schemas.microsoft.com/office/drawing/2010/main">
+                <a:solidFill>
+                  <a:srgbClr val="FFFFFF"/>
+                </a:solidFill>
+              </a14:hiddenFill>
+            </a:ext>
+          </a:extLst>
+        </p:spPr>
+      </p:pic>
     </p:spTree>
     <p:extLst>
       <p:ext uri="{BB962C8B-B14F-4D97-AF65-F5344CB8AC3E}">
-        <p14:creationId xmlns:p14="http://schemas.microsoft.com/office/powerpoint/2010/main" val="1838739997"/>
+        <p14:creationId xmlns:p14="http://schemas.microsoft.com/office/powerpoint/2010/main" val="2858606879"/>
+      </p:ext>
+    </p:extLst>
+  </p:cSld>
+  <p:clrMapOvr>
+    <a:masterClrMapping/>
+  </p:clrMapOvr>
+  <p:timing>
+    <p:tnLst>
+      <p:par>
+        <p:cTn id="1" dur="indefinite" restart="never" nodeType="tmRoot"/>
+      </p:par>
+    </p:tnLst>
+  </p:timing>
+</p:sld>
+</file>
+
+<file path=ppt/slides/slide3.xml><?xml version="1.0" encoding="utf-8"?>
+<p:sld xmlns:a="http://schemas.openxmlformats.org/drawingml/2006/main" xmlns:r="http://schemas.openxmlformats.org/officeDocument/2006/relationships" xmlns:p="http://schemas.openxmlformats.org/presentationml/2006/main">
+  <p:cSld>
+    <p:spTree>
+      <p:nvGrpSpPr>
+        <p:cNvPr id="1" name=""/>
+        <p:cNvGrpSpPr/>
+        <p:nvPr/>
+      </p:nvGrpSpPr>
+      <p:grpSpPr>
+        <a:xfrm>
+          <a:off x="0" y="0"/>
+          <a:ext cx="0" cy="0"/>
+          <a:chOff x="0" y="0"/>
+          <a:chExt cx="0" cy="0"/>
+        </a:xfrm>
+      </p:grpSpPr>
+      <p:sp>
+        <p:nvSpPr>
+          <p:cNvPr id="2" name="Titel 1"/>
+          <p:cNvSpPr>
+            <a:spLocks noGrp="1"/>
+          </p:cNvSpPr>
+          <p:nvPr>
+            <p:ph type="ctrTitle"/>
+          </p:nvPr>
+        </p:nvSpPr>
+        <p:spPr/>
+        <p:txBody>
+          <a:bodyPr>
+            <a:normAutofit/>
+          </a:bodyPr>
+          <a:lstStyle/>
+          <a:p>
+            <a:r>
+              <a:rPr lang="de-CH" dirty="0" err="1" smtClean="0"/>
+              <a:t>Cloud</a:t>
+            </a:r>
+            <a:r>
+              <a:rPr lang="de-CH" dirty="0" smtClean="0"/>
+              <a:t> Rendering</a:t>
+            </a:r>
+            <a:endParaRPr lang="de-CH" dirty="0"/>
+          </a:p>
+        </p:txBody>
+      </p:sp>
+      <p:sp>
+        <p:nvSpPr>
+          <p:cNvPr id="3" name="Untertitel 2"/>
+          <p:cNvSpPr>
+            <a:spLocks noGrp="1"/>
+          </p:cNvSpPr>
+          <p:nvPr>
+            <p:ph type="subTitle" idx="1"/>
+          </p:nvPr>
+        </p:nvSpPr>
+        <p:spPr/>
+        <p:txBody>
+          <a:bodyPr/>
+          <a:lstStyle/>
+          <a:p>
+            <a:endParaRPr lang="de-CH"/>
+          </a:p>
+        </p:txBody>
+      </p:sp>
+      <p:pic>
+        <p:nvPicPr>
+          <p:cNvPr id="2053" name="Picture 5" descr="C:\Users\Cedric Reichenbach\Git\Uni\Ape_On_Tape\presentation\img\graphics\cloud-algorithm_game.png"/>
+          <p:cNvPicPr>
+            <a:picLocks noChangeAspect="1" noChangeArrowheads="1"/>
+          </p:cNvPicPr>
+          <p:nvPr/>
+        </p:nvPicPr>
+        <p:blipFill rotWithShape="1">
+          <a:blip r:embed="rId2">
+            <a:extLst>
+              <a:ext uri="{28A0092B-C50C-407E-A947-70E740481C1C}">
+                <a14:useLocalDpi xmlns:a14="http://schemas.microsoft.com/office/drawing/2010/main" val="0"/>
+              </a:ext>
+            </a:extLst>
+          </a:blip>
+          <a:srcRect b="17042"/>
+          <a:stretch/>
+        </p:blipFill>
+        <p:spPr bwMode="auto">
+          <a:xfrm>
+            <a:off x="1691680" y="1844824"/>
+            <a:ext cx="5715000" cy="4741033"/>
+          </a:xfrm>
+          <a:prstGeom prst="rect">
+            <a:avLst/>
+          </a:prstGeom>
+          <a:noFill/>
+          <a:ln w="12700">
+            <a:solidFill>
+              <a:schemeClr val="tx1"/>
+            </a:solidFill>
+          </a:ln>
+          <a:effectLst/>
+          <a:extLst>
+            <a:ext uri="{909E8E84-426E-40DD-AFC4-6F175D3DCCD1}">
+              <a14:hiddenFill xmlns:a14="http://schemas.microsoft.com/office/drawing/2010/main">
+                <a:solidFill>
+                  <a:srgbClr val="FFFFFF"/>
+                </a:solidFill>
+              </a14:hiddenFill>
+            </a:ext>
+          </a:extLst>
+        </p:spPr>
+      </p:pic>
+    </p:spTree>
+    <p:extLst>
+      <p:ext uri="{BB962C8B-B14F-4D97-AF65-F5344CB8AC3E}">
+        <p14:creationId xmlns:p14="http://schemas.microsoft.com/office/powerpoint/2010/main" val="3131876050"/>
+      </p:ext>
+    </p:extLst>
+  </p:cSld>
+  <p:clrMapOvr>
+    <a:masterClrMapping/>
+  </p:clrMapOvr>
+  <p:timing>
+    <p:tnLst>
+      <p:par>
+        <p:cTn id="1" dur="indefinite" restart="never" nodeType="tmRoot"/>
+      </p:par>
+    </p:tnLst>
+  </p:timing>
+</p:sld>
+</file>
+
+<file path=ppt/slides/slide4.xml><?xml version="1.0" encoding="utf-8"?>
+<p:sld xmlns:a="http://schemas.openxmlformats.org/drawingml/2006/main" xmlns:r="http://schemas.openxmlformats.org/officeDocument/2006/relationships" xmlns:p="http://schemas.openxmlformats.org/presentationml/2006/main">
+  <p:cSld>
+    <p:spTree>
+      <p:nvGrpSpPr>
+        <p:cNvPr id="1" name=""/>
+        <p:cNvGrpSpPr/>
+        <p:nvPr/>
+      </p:nvGrpSpPr>
+      <p:grpSpPr>
+        <a:xfrm>
+          <a:off x="0" y="0"/>
+          <a:ext cx="0" cy="0"/>
+          <a:chOff x="0" y="0"/>
+          <a:chExt cx="0" cy="0"/>
+        </a:xfrm>
+      </p:grpSpPr>
+      <p:sp>
+        <p:nvSpPr>
+          <p:cNvPr id="2" name="Titel 1"/>
+          <p:cNvSpPr>
+            <a:spLocks noGrp="1"/>
+          </p:cNvSpPr>
+          <p:nvPr>
+            <p:ph type="ctrTitle"/>
+          </p:nvPr>
+        </p:nvSpPr>
+        <p:spPr/>
+        <p:txBody>
+          <a:bodyPr>
+            <a:normAutofit/>
+          </a:bodyPr>
+          <a:lstStyle/>
+          <a:p>
+            <a:r>
+              <a:rPr lang="de-CH" dirty="0" err="1" smtClean="0"/>
+              <a:t>Cloud</a:t>
+            </a:r>
+            <a:r>
+              <a:rPr lang="de-CH" dirty="0" smtClean="0"/>
+              <a:t> Rendering</a:t>
+            </a:r>
+            <a:endParaRPr lang="de-CH" dirty="0"/>
+          </a:p>
+        </p:txBody>
+      </p:sp>
+      <p:sp>
+        <p:nvSpPr>
+          <p:cNvPr id="3" name="Untertitel 2"/>
+          <p:cNvSpPr>
+            <a:spLocks noGrp="1"/>
+          </p:cNvSpPr>
+          <p:nvPr>
+            <p:ph type="subTitle" idx="1"/>
+          </p:nvPr>
+        </p:nvSpPr>
+        <p:spPr/>
+        <p:txBody>
+          <a:bodyPr/>
+          <a:lstStyle/>
+          <a:p>
+            <a:endParaRPr lang="de-CH" dirty="0"/>
+          </a:p>
+        </p:txBody>
+      </p:sp>
+      <p:pic>
+        <p:nvPicPr>
+          <p:cNvPr id="3074" name="Picture 2" descr="C:\Users\Cedric Reichenbach\Git\Uni\Ape_On_Tape\presentation\img\graphics\cloud-algorithm_tiles.png"/>
+          <p:cNvPicPr>
+            <a:picLocks noChangeAspect="1" noChangeArrowheads="1"/>
+          </p:cNvPicPr>
+          <p:nvPr/>
+        </p:nvPicPr>
+        <p:blipFill rotWithShape="1">
+          <a:blip r:embed="rId2">
+            <a:extLst>
+              <a:ext uri="{28A0092B-C50C-407E-A947-70E740481C1C}">
+                <a14:useLocalDpi xmlns:a14="http://schemas.microsoft.com/office/drawing/2010/main" val="0"/>
+              </a:ext>
+            </a:extLst>
+          </a:blip>
+          <a:srcRect t="-1" b="17044"/>
+          <a:stretch/>
+        </p:blipFill>
+        <p:spPr bwMode="auto">
+          <a:xfrm>
+            <a:off x="1691680" y="1844824"/>
+            <a:ext cx="5715000" cy="4741033"/>
+          </a:xfrm>
+          <a:prstGeom prst="rect">
+            <a:avLst/>
+          </a:prstGeom>
+          <a:ln w="12700">
+            <a:solidFill>
+              <a:schemeClr val="tx1"/>
+            </a:solidFill>
+          </a:ln>
+          <a:effectLst/>
+          <a:extLst>
+            <a:ext uri="{909E8E84-426E-40DD-AFC4-6F175D3DCCD1}">
+              <a14:hiddenFill xmlns:a14="http://schemas.microsoft.com/office/drawing/2010/main">
+                <a:solidFill>
+                  <a:srgbClr val="FFFFFF"/>
+                </a:solidFill>
+              </a14:hiddenFill>
+            </a:ext>
+          </a:extLst>
+        </p:spPr>
+      </p:pic>
+    </p:spTree>
+    <p:extLst>
+      <p:ext uri="{BB962C8B-B14F-4D97-AF65-F5344CB8AC3E}">
+        <p14:creationId xmlns:p14="http://schemas.microsoft.com/office/powerpoint/2010/main" val="3957724130"/>
+      </p:ext>
+    </p:extLst>
+  </p:cSld>
+  <p:clrMapOvr>
+    <a:masterClrMapping/>
+  </p:clrMapOvr>
+  <p:timing>
+    <p:tnLst>
+      <p:par>
+        <p:cTn id="1" dur="indefinite" restart="never" nodeType="tmRoot"/>
+      </p:par>
+    </p:tnLst>
+  </p:timing>
+</p:sld>
+</file>
+
+<file path=ppt/slides/slide5.xml><?xml version="1.0" encoding="utf-8"?>
+<p:sld xmlns:a="http://schemas.openxmlformats.org/drawingml/2006/main" xmlns:r="http://schemas.openxmlformats.org/officeDocument/2006/relationships" xmlns:p="http://schemas.openxmlformats.org/presentationml/2006/main">
+  <p:cSld>
+    <p:spTree>
+      <p:nvGrpSpPr>
+        <p:cNvPr id="1" name=""/>
+        <p:cNvGrpSpPr/>
+        <p:nvPr/>
+      </p:nvGrpSpPr>
+      <p:grpSpPr>
+        <a:xfrm>
+          <a:off x="0" y="0"/>
+          <a:ext cx="0" cy="0"/>
+          <a:chOff x="0" y="0"/>
+          <a:chExt cx="0" cy="0"/>
+        </a:xfrm>
+      </p:grpSpPr>
+      <p:sp>
+        <p:nvSpPr>
+          <p:cNvPr id="2" name="Titel 1"/>
+          <p:cNvSpPr>
+            <a:spLocks noGrp="1"/>
+          </p:cNvSpPr>
+          <p:nvPr>
+            <p:ph type="ctrTitle"/>
+          </p:nvPr>
+        </p:nvSpPr>
+        <p:spPr/>
+        <p:txBody>
+          <a:bodyPr>
+            <a:normAutofit/>
+          </a:bodyPr>
+          <a:lstStyle/>
+          <a:p>
+            <a:r>
+              <a:rPr lang="de-CH" dirty="0" err="1" smtClean="0"/>
+              <a:t>Cloud</a:t>
+            </a:r>
+            <a:r>
+              <a:rPr lang="de-CH" dirty="0" smtClean="0"/>
+              <a:t> Rendering</a:t>
+            </a:r>
+            <a:endParaRPr lang="de-CH" dirty="0"/>
+          </a:p>
+        </p:txBody>
+      </p:sp>
+      <p:sp>
+        <p:nvSpPr>
+          <p:cNvPr id="3" name="Untertitel 2"/>
+          <p:cNvSpPr>
+            <a:spLocks noGrp="1"/>
+          </p:cNvSpPr>
+          <p:nvPr>
+            <p:ph type="subTitle" idx="1"/>
+          </p:nvPr>
+        </p:nvSpPr>
+        <p:spPr>
+          <a:xfrm>
+            <a:off x="683568" y="1844824"/>
+            <a:ext cx="1008112" cy="3888432"/>
+          </a:xfrm>
+        </p:spPr>
+        <p:txBody>
+          <a:bodyPr/>
+          <a:lstStyle/>
+          <a:p>
+            <a:endParaRPr lang="de-CH"/>
+          </a:p>
+        </p:txBody>
+      </p:sp>
+      <p:pic>
+        <p:nvPicPr>
+          <p:cNvPr id="6" name="Picture 2" descr="C:\Users\Cedric Reichenbach\Git\Uni\Ape_On_Tape\presentation\img\graphics\cloud-algorithm_samples.png"/>
+          <p:cNvPicPr>
+            <a:picLocks noChangeAspect="1" noChangeArrowheads="1"/>
+          </p:cNvPicPr>
+          <p:nvPr/>
+        </p:nvPicPr>
+        <p:blipFill rotWithShape="1">
+          <a:blip r:embed="rId2">
+            <a:extLst>
+              <a:ext uri="{28A0092B-C50C-407E-A947-70E740481C1C}">
+                <a14:useLocalDpi xmlns:a14="http://schemas.microsoft.com/office/drawing/2010/main" val="0"/>
+              </a:ext>
+            </a:extLst>
+          </a:blip>
+          <a:srcRect b="17041"/>
+          <a:stretch/>
+        </p:blipFill>
+        <p:spPr bwMode="auto">
+          <a:xfrm>
+            <a:off x="1691680" y="1844824"/>
+            <a:ext cx="5715000" cy="4741033"/>
+          </a:xfrm>
+          <a:prstGeom prst="rect">
+            <a:avLst/>
+          </a:prstGeom>
+          <a:noFill/>
+          <a:ln w="12700">
+            <a:solidFill>
+              <a:schemeClr val="tx1"/>
+            </a:solidFill>
+          </a:ln>
+          <a:extLst>
+            <a:ext uri="{909E8E84-426E-40DD-AFC4-6F175D3DCCD1}">
+              <a14:hiddenFill xmlns:a14="http://schemas.microsoft.com/office/drawing/2010/main">
+                <a:solidFill>
+                  <a:srgbClr val="FFFFFF"/>
+                </a:solidFill>
+              </a14:hiddenFill>
+            </a:ext>
+          </a:extLst>
+        </p:spPr>
+      </p:pic>
+    </p:spTree>
+    <p:extLst>
+      <p:ext uri="{BB962C8B-B14F-4D97-AF65-F5344CB8AC3E}">
+        <p14:creationId xmlns:p14="http://schemas.microsoft.com/office/powerpoint/2010/main" val="1729833970"/>
+      </p:ext>
+    </p:extLst>
+  </p:cSld>
+  <p:clrMapOvr>
+    <a:masterClrMapping/>
+  </p:clrMapOvr>
+  <p:timing>
+    <p:tnLst>
+      <p:par>
+        <p:cTn id="1" dur="indefinite" restart="never" nodeType="tmRoot"/>
+      </p:par>
+    </p:tnLst>
+  </p:timing>
+</p:sld>
+</file>
+
+<file path=ppt/slides/slide6.xml><?xml version="1.0" encoding="utf-8"?>
+<p:sld xmlns:a="http://schemas.openxmlformats.org/drawingml/2006/main" xmlns:r="http://schemas.openxmlformats.org/officeDocument/2006/relationships" xmlns:p="http://schemas.openxmlformats.org/presentationml/2006/main">
+  <p:cSld>
+    <p:spTree>
+      <p:nvGrpSpPr>
+        <p:cNvPr id="1" name=""/>
+        <p:cNvGrpSpPr/>
+        <p:nvPr/>
+      </p:nvGrpSpPr>
+      <p:grpSpPr>
+        <a:xfrm>
+          <a:off x="0" y="0"/>
+          <a:ext cx="0" cy="0"/>
+          <a:chOff x="0" y="0"/>
+          <a:chExt cx="0" cy="0"/>
+        </a:xfrm>
+      </p:grpSpPr>
+      <p:sp>
+        <p:nvSpPr>
+          <p:cNvPr id="2" name="Titel 1"/>
+          <p:cNvSpPr>
+            <a:spLocks noGrp="1"/>
+          </p:cNvSpPr>
+          <p:nvPr>
+            <p:ph type="ctrTitle"/>
+          </p:nvPr>
+        </p:nvSpPr>
+        <p:spPr/>
+        <p:txBody>
+          <a:bodyPr>
+            <a:normAutofit/>
+          </a:bodyPr>
+          <a:lstStyle/>
+          <a:p>
+            <a:r>
+              <a:rPr lang="de-CH" dirty="0" err="1" smtClean="0"/>
+              <a:t>Cloud</a:t>
+            </a:r>
+            <a:r>
+              <a:rPr lang="de-CH" dirty="0" smtClean="0"/>
+              <a:t> Rendering</a:t>
+            </a:r>
+            <a:endParaRPr lang="de-CH" dirty="0"/>
+          </a:p>
+        </p:txBody>
+      </p:sp>
+      <p:sp>
+        <p:nvSpPr>
+          <p:cNvPr id="3" name="Untertitel 2"/>
+          <p:cNvSpPr>
+            <a:spLocks noGrp="1"/>
+          </p:cNvSpPr>
+          <p:nvPr>
+            <p:ph type="subTitle" idx="1"/>
+          </p:nvPr>
+        </p:nvSpPr>
+        <p:spPr/>
+        <p:txBody>
+          <a:bodyPr/>
+          <a:lstStyle/>
+          <a:p>
+            <a:endParaRPr lang="de-CH"/>
+          </a:p>
+        </p:txBody>
+      </p:sp>
+      <p:pic>
+        <p:nvPicPr>
+          <p:cNvPr id="6" name="Picture 2" descr="C:\Users\Cedric Reichenbach\Git\Uni\Ape_On_Tape\presentation\img\graphics\cloud-algorithm_illustration-1.png"/>
+          <p:cNvPicPr>
+            <a:picLocks noChangeAspect="1" noChangeArrowheads="1"/>
+          </p:cNvPicPr>
+          <p:nvPr/>
+        </p:nvPicPr>
+        <p:blipFill rotWithShape="1">
+          <a:blip r:embed="rId2">
+            <a:extLst>
+              <a:ext uri="{28A0092B-C50C-407E-A947-70E740481C1C}">
+                <a14:useLocalDpi xmlns:a14="http://schemas.microsoft.com/office/drawing/2010/main" val="0"/>
+              </a:ext>
+            </a:extLst>
+          </a:blip>
+          <a:srcRect b="17042"/>
+          <a:stretch/>
+        </p:blipFill>
+        <p:spPr bwMode="auto">
+          <a:xfrm>
+            <a:off x="1691680" y="1844824"/>
+            <a:ext cx="5715000" cy="4741033"/>
+          </a:xfrm>
+          <a:prstGeom prst="rect">
+            <a:avLst/>
+          </a:prstGeom>
+          <a:noFill/>
+          <a:ln w="12700">
+            <a:solidFill>
+              <a:schemeClr val="tx1"/>
+            </a:solidFill>
+          </a:ln>
+          <a:extLst>
+            <a:ext uri="{909E8E84-426E-40DD-AFC4-6F175D3DCCD1}">
+              <a14:hiddenFill xmlns:a14="http://schemas.microsoft.com/office/drawing/2010/main">
+                <a:solidFill>
+                  <a:srgbClr val="FFFFFF"/>
+                </a:solidFill>
+              </a14:hiddenFill>
+            </a:ext>
+          </a:extLst>
+        </p:spPr>
+      </p:pic>
+    </p:spTree>
+    <p:extLst>
+      <p:ext uri="{BB962C8B-B14F-4D97-AF65-F5344CB8AC3E}">
+        <p14:creationId xmlns:p14="http://schemas.microsoft.com/office/powerpoint/2010/main" val="3211491212"/>
+      </p:ext>
+    </p:extLst>
+  </p:cSld>
+  <p:clrMapOvr>
+    <a:masterClrMapping/>
+  </p:clrMapOvr>
+  <p:timing>
+    <p:tnLst>
+      <p:par>
+        <p:cTn id="1" dur="indefinite" restart="never" nodeType="tmRoot"/>
+      </p:par>
+    </p:tnLst>
+  </p:timing>
+</p:sld>
+</file>
+
+<file path=ppt/slides/slide7.xml><?xml version="1.0" encoding="utf-8"?>
+<p:sld xmlns:a="http://schemas.openxmlformats.org/drawingml/2006/main" xmlns:r="http://schemas.openxmlformats.org/officeDocument/2006/relationships" xmlns:p="http://schemas.openxmlformats.org/presentationml/2006/main">
+  <p:cSld>
+    <p:spTree>
+      <p:nvGrpSpPr>
+        <p:cNvPr id="1" name=""/>
+        <p:cNvGrpSpPr/>
+        <p:nvPr/>
+      </p:nvGrpSpPr>
+      <p:grpSpPr>
+        <a:xfrm>
+          <a:off x="0" y="0"/>
+          <a:ext cx="0" cy="0"/>
+          <a:chOff x="0" y="0"/>
+          <a:chExt cx="0" cy="0"/>
+        </a:xfrm>
+      </p:grpSpPr>
+      <p:sp>
+        <p:nvSpPr>
+          <p:cNvPr id="2" name="Titel 1"/>
+          <p:cNvSpPr>
+            <a:spLocks noGrp="1"/>
+          </p:cNvSpPr>
+          <p:nvPr>
+            <p:ph type="ctrTitle"/>
+          </p:nvPr>
+        </p:nvSpPr>
+        <p:spPr/>
+        <p:txBody>
+          <a:bodyPr>
+            <a:normAutofit/>
+          </a:bodyPr>
+          <a:lstStyle/>
+          <a:p>
+            <a:r>
+              <a:rPr lang="de-CH" dirty="0" err="1" smtClean="0"/>
+              <a:t>Cloud</a:t>
+            </a:r>
+            <a:r>
+              <a:rPr lang="de-CH" dirty="0" smtClean="0"/>
+              <a:t> Rendering</a:t>
+            </a:r>
+            <a:endParaRPr lang="de-CH" dirty="0"/>
+          </a:p>
+        </p:txBody>
+      </p:sp>
+      <p:sp>
+        <p:nvSpPr>
+          <p:cNvPr id="3" name="Untertitel 2"/>
+          <p:cNvSpPr>
+            <a:spLocks noGrp="1"/>
+          </p:cNvSpPr>
+          <p:nvPr>
+            <p:ph type="subTitle" idx="1"/>
+          </p:nvPr>
+        </p:nvSpPr>
+        <p:spPr/>
+        <p:txBody>
+          <a:bodyPr/>
+          <a:lstStyle/>
+          <a:p>
+            <a:endParaRPr lang="de-CH"/>
+          </a:p>
+        </p:txBody>
+      </p:sp>
+      <p:pic>
+        <p:nvPicPr>
+          <p:cNvPr id="6" name="Picture 2" descr="C:\Users\Cedric Reichenbach\Git\Uni\Ape_On_Tape\presentation\img\graphics\cloud-algorithm_illustration-2.png"/>
+          <p:cNvPicPr>
+            <a:picLocks noChangeAspect="1" noChangeArrowheads="1"/>
+          </p:cNvPicPr>
+          <p:nvPr/>
+        </p:nvPicPr>
+        <p:blipFill rotWithShape="1">
+          <a:blip r:embed="rId2">
+            <a:extLst>
+              <a:ext uri="{28A0092B-C50C-407E-A947-70E740481C1C}">
+                <a14:useLocalDpi xmlns:a14="http://schemas.microsoft.com/office/drawing/2010/main" val="0"/>
+              </a:ext>
+            </a:extLst>
+          </a:blip>
+          <a:srcRect t="-1" b="17043"/>
+          <a:stretch/>
+        </p:blipFill>
+        <p:spPr bwMode="auto">
+          <a:xfrm>
+            <a:off x="1691680" y="1844824"/>
+            <a:ext cx="5715000" cy="4741034"/>
+          </a:xfrm>
+          <a:prstGeom prst="rect">
+            <a:avLst/>
+          </a:prstGeom>
+          <a:noFill/>
+          <a:ln w="12700">
+            <a:solidFill>
+              <a:schemeClr val="tx1"/>
+            </a:solidFill>
+          </a:ln>
+          <a:extLst>
+            <a:ext uri="{909E8E84-426E-40DD-AFC4-6F175D3DCCD1}">
+              <a14:hiddenFill xmlns:a14="http://schemas.microsoft.com/office/drawing/2010/main">
+                <a:solidFill>
+                  <a:srgbClr val="FFFFFF"/>
+                </a:solidFill>
+              </a14:hiddenFill>
+            </a:ext>
+          </a:extLst>
+        </p:spPr>
+      </p:pic>
+    </p:spTree>
+    <p:extLst>
+      <p:ext uri="{BB962C8B-B14F-4D97-AF65-F5344CB8AC3E}">
+        <p14:creationId xmlns:p14="http://schemas.microsoft.com/office/powerpoint/2010/main" val="492354357"/>
+      </p:ext>
+    </p:extLst>
+  </p:cSld>
+  <p:clrMapOvr>
+    <a:masterClrMapping/>
+  </p:clrMapOvr>
+  <p:timing>
+    <p:tnLst>
+      <p:par>
+        <p:cTn id="1" dur="indefinite" restart="never" nodeType="tmRoot"/>
+      </p:par>
+    </p:tnLst>
+  </p:timing>
+</p:sld>
+</file>
+
+<file path=ppt/slides/slide8.xml><?xml version="1.0" encoding="utf-8"?>
+<p:sld xmlns:a="http://schemas.openxmlformats.org/drawingml/2006/main" xmlns:r="http://schemas.openxmlformats.org/officeDocument/2006/relationships" xmlns:p="http://schemas.openxmlformats.org/presentationml/2006/main">
+  <p:cSld>
+    <p:spTree>
+      <p:nvGrpSpPr>
+        <p:cNvPr id="1" name=""/>
+        <p:cNvGrpSpPr/>
+        <p:nvPr/>
+      </p:nvGrpSpPr>
+      <p:grpSpPr>
+        <a:xfrm>
+          <a:off x="0" y="0"/>
+          <a:ext cx="0" cy="0"/>
+          <a:chOff x="0" y="0"/>
+          <a:chExt cx="0" cy="0"/>
+        </a:xfrm>
+      </p:grpSpPr>
+      <p:sp>
+        <p:nvSpPr>
+          <p:cNvPr id="2" name="Titel 1"/>
+          <p:cNvSpPr>
+            <a:spLocks noGrp="1"/>
+          </p:cNvSpPr>
+          <p:nvPr>
+            <p:ph type="ctrTitle"/>
+          </p:nvPr>
+        </p:nvSpPr>
+        <p:spPr/>
+        <p:txBody>
+          <a:bodyPr>
+            <a:normAutofit/>
+          </a:bodyPr>
+          <a:lstStyle/>
+          <a:p>
+            <a:r>
+              <a:rPr lang="de-CH" dirty="0" err="1" smtClean="0"/>
+              <a:t>Cloud</a:t>
+            </a:r>
+            <a:r>
+              <a:rPr lang="de-CH" dirty="0" smtClean="0"/>
+              <a:t> Rendering</a:t>
+            </a:r>
+            <a:endParaRPr lang="de-CH" dirty="0"/>
+          </a:p>
+        </p:txBody>
+      </p:sp>
+      <p:sp>
+        <p:nvSpPr>
+          <p:cNvPr id="3" name="Untertitel 2"/>
+          <p:cNvSpPr>
+            <a:spLocks noGrp="1"/>
+          </p:cNvSpPr>
+          <p:nvPr>
+            <p:ph type="subTitle" idx="1"/>
+          </p:nvPr>
+        </p:nvSpPr>
+        <p:spPr/>
+        <p:txBody>
+          <a:bodyPr/>
+          <a:lstStyle/>
+          <a:p>
+            <a:endParaRPr lang="de-CH"/>
+          </a:p>
+        </p:txBody>
+      </p:sp>
+      <p:pic>
+        <p:nvPicPr>
+          <p:cNvPr id="6" name="Picture 2" descr="C:\Users\Cedric Reichenbach\Git\Uni\Ape_On_Tape\presentation\img\graphics\cloud-algorithm_illustration-3.png"/>
+          <p:cNvPicPr>
+            <a:picLocks noChangeAspect="1" noChangeArrowheads="1"/>
+          </p:cNvPicPr>
+          <p:nvPr/>
+        </p:nvPicPr>
+        <p:blipFill rotWithShape="1">
+          <a:blip r:embed="rId2">
+            <a:extLst>
+              <a:ext uri="{28A0092B-C50C-407E-A947-70E740481C1C}">
+                <a14:useLocalDpi xmlns:a14="http://schemas.microsoft.com/office/drawing/2010/main" val="0"/>
+              </a:ext>
+            </a:extLst>
+          </a:blip>
+          <a:srcRect b="17042"/>
+          <a:stretch/>
+        </p:blipFill>
+        <p:spPr bwMode="auto">
+          <a:xfrm>
+            <a:off x="1691680" y="1844824"/>
+            <a:ext cx="5715000" cy="4741033"/>
+          </a:xfrm>
+          <a:prstGeom prst="rect">
+            <a:avLst/>
+          </a:prstGeom>
+          <a:noFill/>
+          <a:ln w="12700">
+            <a:solidFill>
+              <a:schemeClr val="tx1"/>
+            </a:solidFill>
+          </a:ln>
+          <a:extLst>
+            <a:ext uri="{909E8E84-426E-40DD-AFC4-6F175D3DCCD1}">
+              <a14:hiddenFill xmlns:a14="http://schemas.microsoft.com/office/drawing/2010/main">
+                <a:solidFill>
+                  <a:srgbClr val="FFFFFF"/>
+                </a:solidFill>
+              </a14:hiddenFill>
+            </a:ext>
+          </a:extLst>
+        </p:spPr>
+      </p:pic>
+    </p:spTree>
+    <p:extLst>
+      <p:ext uri="{BB962C8B-B14F-4D97-AF65-F5344CB8AC3E}">
+        <p14:creationId xmlns:p14="http://schemas.microsoft.com/office/powerpoint/2010/main" val="1790979652"/>
+      </p:ext>
+    </p:extLst>
+  </p:cSld>
+  <p:clrMapOvr>
+    <a:masterClrMapping/>
+  </p:clrMapOvr>
+  <p:timing>
+    <p:tnLst>
+      <p:par>
+        <p:cTn id="1" dur="indefinite" restart="never" nodeType="tmRoot"/>
+      </p:par>
+    </p:tnLst>
+  </p:timing>
+</p:sld>
+</file>
+
+<file path=ppt/slides/slide9.xml><?xml version="1.0" encoding="utf-8"?>
+<p:sld xmlns:a="http://schemas.openxmlformats.org/drawingml/2006/main" xmlns:r="http://schemas.openxmlformats.org/officeDocument/2006/relationships" xmlns:p="http://schemas.openxmlformats.org/presentationml/2006/main">
+  <p:cSld>
+    <p:spTree>
+      <p:nvGrpSpPr>
+        <p:cNvPr id="1" name=""/>
+        <p:cNvGrpSpPr/>
+        <p:nvPr/>
+      </p:nvGrpSpPr>
+      <p:grpSpPr>
+        <a:xfrm>
+          <a:off x="0" y="0"/>
+          <a:ext cx="0" cy="0"/>
+          <a:chOff x="0" y="0"/>
+          <a:chExt cx="0" cy="0"/>
+        </a:xfrm>
+      </p:grpSpPr>
+      <p:sp>
+        <p:nvSpPr>
+          <p:cNvPr id="2" name="Titel 1"/>
+          <p:cNvSpPr>
+            <a:spLocks noGrp="1"/>
+          </p:cNvSpPr>
+          <p:nvPr>
+            <p:ph type="ctrTitle"/>
+          </p:nvPr>
+        </p:nvSpPr>
+        <p:spPr/>
+        <p:txBody>
+          <a:bodyPr/>
+          <a:lstStyle/>
+          <a:p>
+            <a:r>
+              <a:rPr lang="en-US" dirty="0" smtClean="0"/>
+              <a:t>Cloud Rendering</a:t>
+            </a:r>
+            <a:endParaRPr lang="en-US" dirty="0"/>
+          </a:p>
+        </p:txBody>
+      </p:sp>
+      <p:sp>
+        <p:nvSpPr>
+          <p:cNvPr id="3" name="Untertitel 2"/>
+          <p:cNvSpPr>
+            <a:spLocks noGrp="1"/>
+          </p:cNvSpPr>
+          <p:nvPr>
+            <p:ph type="subTitle" idx="1"/>
+          </p:nvPr>
+        </p:nvSpPr>
+        <p:spPr/>
+        <p:txBody>
+          <a:bodyPr/>
+          <a:lstStyle/>
+          <a:p>
+            <a:endParaRPr lang="en-US" dirty="0"/>
+          </a:p>
+        </p:txBody>
+      </p:sp>
+      <p:pic>
+        <p:nvPicPr>
+          <p:cNvPr id="8194" name="Picture 2" descr="C:\Users\Cedric Reichenbach\Git\Uni\Ape_On_Tape\presentation\img\screenshots\cloud-rendering_demo.png"/>
+          <p:cNvPicPr>
+            <a:picLocks noChangeAspect="1" noChangeArrowheads="1"/>
+          </p:cNvPicPr>
+          <p:nvPr/>
+        </p:nvPicPr>
+        <p:blipFill>
+          <a:blip r:embed="rId2">
+            <a:extLst>
+              <a:ext uri="{28A0092B-C50C-407E-A947-70E740481C1C}">
+                <a14:useLocalDpi xmlns:a14="http://schemas.microsoft.com/office/drawing/2010/main" val="0"/>
+              </a:ext>
+            </a:extLst>
+          </a:blip>
+          <a:srcRect/>
+          <a:stretch>
+            <a:fillRect/>
+          </a:stretch>
+        </p:blipFill>
+        <p:spPr bwMode="auto">
+          <a:xfrm>
+            <a:off x="2195736" y="1885524"/>
+            <a:ext cx="4680520" cy="4711828"/>
+          </a:xfrm>
+          <a:prstGeom prst="rect">
+            <a:avLst/>
+          </a:prstGeom>
+          <a:noFill/>
+          <a:ln w="12700">
+            <a:solidFill>
+              <a:schemeClr val="tx1"/>
+            </a:solidFill>
+          </a:ln>
+          <a:extLst>
+            <a:ext uri="{909E8E84-426E-40DD-AFC4-6F175D3DCCD1}">
+              <a14:hiddenFill xmlns:a14="http://schemas.microsoft.com/office/drawing/2010/main">
+                <a:solidFill>
+                  <a:srgbClr val="FFFFFF"/>
+                </a:solidFill>
+              </a14:hiddenFill>
+            </a:ext>
+          </a:extLst>
+        </p:spPr>
+      </p:pic>
+    </p:spTree>
+    <p:extLst>
+      <p:ext uri="{BB962C8B-B14F-4D97-AF65-F5344CB8AC3E}">
+        <p14:creationId xmlns:p14="http://schemas.microsoft.com/office/powerpoint/2010/main" val="3008560215"/>
       </p:ext>
     </p:extLst>
   </p:cSld>
@@ -3469,7 +4592,7 @@
 <file path=ppt/tags/tag1.xml><?xml version="1.0" encoding="utf-8"?>
 <p:tagLst xmlns:a="http://schemas.openxmlformats.org/drawingml/2006/main" xmlns:r="http://schemas.openxmlformats.org/officeDocument/2006/relationships" xmlns:p="http://schemas.openxmlformats.org/presentationml/2006/main">
   <p:tag name="MMPROD_NEXTUNIQUEID" val="10009"/>
-  <p:tag name="MMPROD_UIDATA" val="&lt;database version=&quot;7.0&quot;&gt;&lt;object type=&quot;1&quot; unique_id=&quot;10001&quot;&gt;&lt;object type=&quot;8&quot; unique_id=&quot;10002&quot;&gt;&lt;/object&gt;&lt;object type=&quot;2&quot; unique_id=&quot;10003&quot;&gt;&lt;object type=&quot;3&quot; unique_id=&quot;10004&quot;&gt;&lt;property id=&quot;20148&quot; value=&quot;5&quot;/&gt;&lt;property id=&quot;20300&quot; value=&quot;Folie 1 - &amp;quot;Cloud Rendering&amp;quot;&quot;/&gt;&lt;property id=&quot;20307&quot; value=&quot;256&quot;/&gt;&lt;/object&gt;&lt;object type=&quot;3&quot; unique_id=&quot;10047&quot;&gt;&lt;property id=&quot;20148&quot; value=&quot;5&quot;/&gt;&lt;property id=&quot;20300&quot; value=&quot;Folie 2&quot;/&gt;&lt;property id=&quot;20307&quot; value=&quot;257&quot;/&gt;&lt;/object&gt;&lt;/object&gt;&lt;/object&gt;&lt;/database&gt;"/>
+  <p:tag name="MMPROD_UIDATA" val="&lt;database version=&quot;7.0&quot;&gt;&lt;object type=&quot;1&quot; unique_id=&quot;10001&quot;&gt;&lt;object type=&quot;8&quot; unique_id=&quot;10002&quot;&gt;&lt;/object&gt;&lt;object type=&quot;2&quot; unique_id=&quot;10003&quot;&gt;&lt;object type=&quot;3&quot; unique_id=&quot;10004&quot;&gt;&lt;property id=&quot;20148&quot; value=&quot;5&quot;/&gt;&lt;property id=&quot;20300&quot; value=&quot;Folie 1 - &amp;quot;Cloud Rendering&amp;quot;&quot;/&gt;&lt;property id=&quot;20307&quot; value=&quot;256&quot;/&gt;&lt;/object&gt;&lt;object type=&quot;3&quot; unique_id=&quot;10060&quot;&gt;&lt;property id=&quot;20148&quot; value=&quot;5&quot;/&gt;&lt;property id=&quot;20300&quot; value=&quot;Folie 2 - &amp;quot;Cloud Rendering&amp;quot;&quot;/&gt;&lt;property id=&quot;20307&quot; value=&quot;258&quot;/&gt;&lt;/object&gt;&lt;object type=&quot;3&quot; unique_id=&quot;10138&quot;&gt;&lt;property id=&quot;20148&quot; value=&quot;5&quot;/&gt;&lt;property id=&quot;20300&quot; value=&quot;Folie 3 - &amp;quot;Cloud Rendering&amp;quot;&quot;/&gt;&lt;property id=&quot;20307&quot; value=&quot;259&quot;/&gt;&lt;/object&gt;&lt;object type=&quot;3&quot; unique_id=&quot;10154&quot;&gt;&lt;property id=&quot;20148&quot; value=&quot;5&quot;/&gt;&lt;property id=&quot;20300&quot; value=&quot;Folie 4 - &amp;quot;Cloud Rendering&amp;quot;&quot;/&gt;&lt;property id=&quot;20307&quot; value=&quot;260&quot;/&gt;&lt;/object&gt;&lt;object type=&quot;3&quot; unique_id=&quot;10185&quot;&gt;&lt;property id=&quot;20148&quot; value=&quot;5&quot;/&gt;&lt;property id=&quot;20300&quot; value=&quot;Folie 5 - &amp;quot;Cloud Rendering&amp;quot;&quot;/&gt;&lt;property id=&quot;20307&quot; value=&quot;261&quot;/&gt;&lt;/object&gt;&lt;object type=&quot;3&quot; unique_id=&quot;10186&quot;&gt;&lt;property id=&quot;20148&quot; value=&quot;5&quot;/&gt;&lt;property id=&quot;20300&quot; value=&quot;Folie 6 - &amp;quot;Cloud Rendering&amp;quot;&quot;/&gt;&lt;property id=&quot;20307&quot; value=&quot;262&quot;/&gt;&lt;/object&gt;&lt;object type=&quot;3&quot; unique_id=&quot;10187&quot;&gt;&lt;property id=&quot;20148&quot; value=&quot;5&quot;/&gt;&lt;property id=&quot;20300&quot; value=&quot;Folie 7 - &amp;quot;Cloud Rendering&amp;quot;&quot;/&gt;&lt;property id=&quot;20307&quot; value=&quot;263&quot;/&gt;&lt;/object&gt;&lt;object type=&quot;3&quot; unique_id=&quot;10215&quot;&gt;&lt;property id=&quot;20148&quot; value=&quot;5&quot;/&gt;&lt;property id=&quot;20300&quot; value=&quot;Folie 8 - &amp;quot;Cloud Rendering&amp;quot;&quot;/&gt;&lt;property id=&quot;20307&quot; value=&quot;264&quot;/&gt;&lt;/object&gt;&lt;object type=&quot;3&quot; unique_id=&quot;10286&quot;&gt;&lt;property id=&quot;20148&quot; value=&quot;5&quot;/&gt;&lt;property id=&quot;20300&quot; value=&quot;Folie 9 - &amp;quot;Cloud Rendering&amp;quot;&quot;/&gt;&lt;property id=&quot;20307&quot; value=&quot;265&quot;/&gt;&lt;/object&gt;&lt;/object&gt;&lt;/object&gt;&lt;/database&gt;"/>
   <p:tag name="SECTOMILLISECCONVERTED" val="1"/>
 </p:tagLst>
 </file>

</xml_diff>